<commit_message>
docs: finalisation dossier projet et dossier professionnel DWWM
</commit_message>
<xml_diff>
--- a/Dossier_Projet/support-presentation-harmoniawear-dwwm.pptx
+++ b/Dossier_Projet/support-presentation-harmoniawear-dwwm.pptx
@@ -234,7 +234,7 @@
           <a:p>
             <a:fld id="{C7B1924C-4850-45BA-9A7F-172BB6B6B704}" type="datetimeFigureOut">
               <a:rPr lang="fr-FR" smtClean="0"/>
-              <a:t>20/01/2026</a:t>
+              <a:t>22/01/2026</a:t>
             </a:fld>
             <a:endParaRPr lang="fr-FR"/>
           </a:p>
@@ -742,7 +742,7 @@
           <a:p>
             <a:fld id="{54507216-2ECE-46D4-B570-0989022AB166}" type="datetimeFigureOut">
               <a:rPr lang="fr-FR" smtClean="0"/>
-              <a:t>19/01/2026</a:t>
+              <a:t>22/01/2026</a:t>
             </a:fld>
             <a:endParaRPr lang="fr-FR"/>
           </a:p>
@@ -940,7 +940,7 @@
           <a:p>
             <a:fld id="{54507216-2ECE-46D4-B570-0989022AB166}" type="datetimeFigureOut">
               <a:rPr lang="fr-FR" smtClean="0"/>
-              <a:t>19/01/2026</a:t>
+              <a:t>22/01/2026</a:t>
             </a:fld>
             <a:endParaRPr lang="fr-FR"/>
           </a:p>
@@ -1148,7 +1148,7 @@
           <a:p>
             <a:fld id="{54507216-2ECE-46D4-B570-0989022AB166}" type="datetimeFigureOut">
               <a:rPr lang="fr-FR" smtClean="0"/>
-              <a:t>19/01/2026</a:t>
+              <a:t>22/01/2026</a:t>
             </a:fld>
             <a:endParaRPr lang="fr-FR"/>
           </a:p>
@@ -1346,7 +1346,7 @@
           <a:p>
             <a:fld id="{54507216-2ECE-46D4-B570-0989022AB166}" type="datetimeFigureOut">
               <a:rPr lang="fr-FR" smtClean="0"/>
-              <a:t>19/01/2026</a:t>
+              <a:t>22/01/2026</a:t>
             </a:fld>
             <a:endParaRPr lang="fr-FR"/>
           </a:p>
@@ -1621,7 +1621,7 @@
           <a:p>
             <a:fld id="{54507216-2ECE-46D4-B570-0989022AB166}" type="datetimeFigureOut">
               <a:rPr lang="fr-FR" smtClean="0"/>
-              <a:t>19/01/2026</a:t>
+              <a:t>22/01/2026</a:t>
             </a:fld>
             <a:endParaRPr lang="fr-FR"/>
           </a:p>
@@ -1886,7 +1886,7 @@
           <a:p>
             <a:fld id="{54507216-2ECE-46D4-B570-0989022AB166}" type="datetimeFigureOut">
               <a:rPr lang="fr-FR" smtClean="0"/>
-              <a:t>19/01/2026</a:t>
+              <a:t>22/01/2026</a:t>
             </a:fld>
             <a:endParaRPr lang="fr-FR"/>
           </a:p>
@@ -2298,7 +2298,7 @@
           <a:p>
             <a:fld id="{54507216-2ECE-46D4-B570-0989022AB166}" type="datetimeFigureOut">
               <a:rPr lang="fr-FR" smtClean="0"/>
-              <a:t>19/01/2026</a:t>
+              <a:t>22/01/2026</a:t>
             </a:fld>
             <a:endParaRPr lang="fr-FR"/>
           </a:p>
@@ -2439,7 +2439,7 @@
           <a:p>
             <a:fld id="{54507216-2ECE-46D4-B570-0989022AB166}" type="datetimeFigureOut">
               <a:rPr lang="fr-FR" smtClean="0"/>
-              <a:t>19/01/2026</a:t>
+              <a:t>22/01/2026</a:t>
             </a:fld>
             <a:endParaRPr lang="fr-FR"/>
           </a:p>
@@ -2552,7 +2552,7 @@
           <a:p>
             <a:fld id="{54507216-2ECE-46D4-B570-0989022AB166}" type="datetimeFigureOut">
               <a:rPr lang="fr-FR" smtClean="0"/>
-              <a:t>19/01/2026</a:t>
+              <a:t>22/01/2026</a:t>
             </a:fld>
             <a:endParaRPr lang="fr-FR"/>
           </a:p>
@@ -2863,7 +2863,7 @@
           <a:p>
             <a:fld id="{54507216-2ECE-46D4-B570-0989022AB166}" type="datetimeFigureOut">
               <a:rPr lang="fr-FR" smtClean="0"/>
-              <a:t>19/01/2026</a:t>
+              <a:t>22/01/2026</a:t>
             </a:fld>
             <a:endParaRPr lang="fr-FR"/>
           </a:p>
@@ -3151,7 +3151,7 @@
           <a:p>
             <a:fld id="{54507216-2ECE-46D4-B570-0989022AB166}" type="datetimeFigureOut">
               <a:rPr lang="fr-FR" smtClean="0"/>
-              <a:t>19/01/2026</a:t>
+              <a:t>22/01/2026</a:t>
             </a:fld>
             <a:endParaRPr lang="fr-FR"/>
           </a:p>
@@ -3392,7 +3392,7 @@
           <a:p>
             <a:fld id="{54507216-2ECE-46D4-B570-0989022AB166}" type="datetimeFigureOut">
               <a:rPr lang="fr-FR" smtClean="0"/>
-              <a:t>19/01/2026</a:t>
+              <a:t>22/01/2026</a:t>
             </a:fld>
             <a:endParaRPr lang="fr-FR"/>
           </a:p>
@@ -4950,7 +4950,15 @@
             </a:pPr>
             <a:r>
               <a:rPr lang="fr-FR" sz="1800" dirty="0"/>
-              <a:t> Structure de dossiers claire et organisée (front-end / back-end / composants)</a:t>
+              <a:t> Structure de dossiers claire et organisée (front-end / </a:t>
+            </a:r>
+            <a:r>
+              <a:rPr lang="fr-FR" sz="1800" dirty="0" err="1"/>
+              <a:t>back-end</a:t>
+            </a:r>
+            <a:r>
+              <a:rPr lang="fr-FR" sz="1800" dirty="0"/>
+              <a:t> / composants)</a:t>
             </a:r>
           </a:p>
           <a:p>
@@ -5714,8 +5722,13 @@
             </a:pPr>
             <a:r>
               <a:rPr lang="fr-FR" sz="1800" dirty="0"/>
-              <a:t> Gestion de la synchronisation entre front-end et back-end</a:t>
-            </a:r>
+              <a:t> Gestion de la synchronisation entre front-end et </a:t>
+            </a:r>
+            <a:r>
+              <a:rPr lang="fr-FR" sz="1800" dirty="0" err="1"/>
+              <a:t>back-end</a:t>
+            </a:r>
+            <a:endParaRPr lang="fr-FR" sz="1800" dirty="0"/>
           </a:p>
           <a:p>
             <a:pPr algn="l" eaLnBrk="0" fontAlgn="base" hangingPunct="0">
@@ -7018,8 +7031,31 @@
                 <a:effectLst/>
                 <a:latin typeface="Arial" panose="020B0604020202020204" pitchFamily="34" charset="0"/>
               </a:rPr>
-              <a:t> Séparer clairement le front-end et le back-end</a:t>
-            </a:r>
+              <a:t> Séparer clairement le front-end et le </a:t>
+            </a:r>
+            <a:r>
+              <a:rPr kumimoji="0" lang="fr-FR" altLang="fr-FR" sz="1800" b="0" i="0" u="none" strike="noStrike" cap="none" normalizeH="0" baseline="0" dirty="0" err="1">
+                <a:ln>
+                  <a:noFill/>
+                </a:ln>
+                <a:solidFill>
+                  <a:schemeClr val="tx1"/>
+                </a:solidFill>
+                <a:effectLst/>
+                <a:latin typeface="Arial" panose="020B0604020202020204" pitchFamily="34" charset="0"/>
+              </a:rPr>
+              <a:t>back-end</a:t>
+            </a:r>
+            <a:endParaRPr kumimoji="0" lang="fr-FR" altLang="fr-FR" sz="1800" b="0" i="0" u="none" strike="noStrike" cap="none" normalizeH="0" baseline="0" dirty="0">
+              <a:ln>
+                <a:noFill/>
+              </a:ln>
+              <a:solidFill>
+                <a:schemeClr val="tx1"/>
+              </a:solidFill>
+              <a:effectLst/>
+              <a:latin typeface="Arial" panose="020B0604020202020204" pitchFamily="34" charset="0"/>
+            </a:endParaRPr>
           </a:p>
           <a:p>
             <a:pPr marL="0" marR="0" lvl="0" indent="0" algn="l" defTabSz="914400" rtl="0" eaLnBrk="0" fontAlgn="base" latinLnBrk="0" hangingPunct="0">
@@ -7172,7 +7208,7 @@
         <p:spPr>
           <a:xfrm>
             <a:off x="1586753" y="2140790"/>
-            <a:ext cx="9144000" cy="3713445"/>
+            <a:ext cx="9144000" cy="3903394"/>
           </a:xfrm>
         </p:spPr>
         <p:txBody>
@@ -7269,8 +7305,31 @@
                 <a:effectLst/>
                 <a:latin typeface="Arial" panose="020B0604020202020204" pitchFamily="34" charset="0"/>
               </a:rPr>
-              <a:t> API back-end</a:t>
-            </a:r>
+              <a:t> API </a:t>
+            </a:r>
+            <a:r>
+              <a:rPr kumimoji="0" lang="fr-FR" altLang="fr-FR" sz="7200" b="0" i="0" u="none" strike="noStrike" cap="none" normalizeH="0" baseline="0" dirty="0" err="1">
+                <a:ln>
+                  <a:noFill/>
+                </a:ln>
+                <a:solidFill>
+                  <a:schemeClr val="tx1"/>
+                </a:solidFill>
+                <a:effectLst/>
+                <a:latin typeface="Arial" panose="020B0604020202020204" pitchFamily="34" charset="0"/>
+              </a:rPr>
+              <a:t>back-end</a:t>
+            </a:r>
+            <a:endParaRPr kumimoji="0" lang="fr-FR" altLang="fr-FR" sz="7200" b="0" i="0" u="none" strike="noStrike" cap="none" normalizeH="0" baseline="0" dirty="0">
+              <a:ln>
+                <a:noFill/>
+              </a:ln>
+              <a:solidFill>
+                <a:schemeClr val="tx1"/>
+              </a:solidFill>
+              <a:effectLst/>
+              <a:latin typeface="Arial" panose="020B0604020202020204" pitchFamily="34" charset="0"/>
+            </a:endParaRPr>
           </a:p>
           <a:p>
             <a:pPr lvl="0" algn="l" eaLnBrk="0" fontAlgn="base" hangingPunct="0">
@@ -7507,6 +7566,49 @@
             <a:r>
               <a:rPr lang="fr-FR" sz="7200" dirty="0"/>
               <a:t>Authentification utilisateur avancée</a:t>
+            </a:r>
+          </a:p>
+          <a:p>
+            <a:pPr lvl="0" algn="l" eaLnBrk="0" fontAlgn="base" hangingPunct="0">
+              <a:lnSpc>
+                <a:spcPct val="100000"/>
+              </a:lnSpc>
+              <a:spcBef>
+                <a:spcPct val="0"/>
+              </a:spcBef>
+              <a:spcAft>
+                <a:spcPct val="0"/>
+              </a:spcAft>
+            </a:pPr>
+            <a:endParaRPr lang="fr-FR" sz="7200" b="1" dirty="0"/>
+          </a:p>
+          <a:p>
+            <a:pPr lvl="0" algn="l" eaLnBrk="0" fontAlgn="base" hangingPunct="0">
+              <a:lnSpc>
+                <a:spcPct val="100000"/>
+              </a:lnSpc>
+              <a:spcBef>
+                <a:spcPct val="0"/>
+              </a:spcBef>
+              <a:spcAft>
+                <a:spcPct val="0"/>
+              </a:spcAft>
+            </a:pPr>
+            <a:r>
+              <a:rPr lang="fr-FR" sz="7200" b="1" dirty="0"/>
+              <a:t>P.S. </a:t>
+            </a:r>
+            <a:r>
+              <a:rPr lang="fr-FR" sz="7200" dirty="0"/>
+              <a:t>Authentification JWT : </a:t>
+            </a:r>
+            <a:r>
+              <a:rPr lang="fr-FR" sz="7200" b="1" dirty="0"/>
+              <a:t>Opérationnelle en Back-end</a:t>
+            </a:r>
+            <a:r>
+              <a:rPr lang="fr-FR" sz="7200" dirty="0"/>
+              <a:t> (pour démonstration technique).</a:t>
             </a:r>
             <a:endParaRPr lang="fr-FR" sz="7200" b="1" dirty="0"/>
           </a:p>
@@ -8192,7 +8294,15 @@
             </a:pPr>
             <a:r>
               <a:rPr lang="fr-FR" sz="1800" dirty="0"/>
-              <a:t> Le back-end centralise la logique métier</a:t>
+              <a:t> Le </a:t>
+            </a:r>
+            <a:r>
+              <a:rPr lang="fr-FR" sz="1800" dirty="0" err="1"/>
+              <a:t>back-end</a:t>
+            </a:r>
+            <a:r>
+              <a:rPr lang="fr-FR" sz="1800" dirty="0"/>
+              <a:t> centralise la logique métier</a:t>
             </a:r>
           </a:p>
           <a:p>

</xml_diff>

<commit_message>
docs: finalisation dossier projet, dossier professionnel et support PPT DWWM
</commit_message>
<xml_diff>
--- a/Dossier_Projet/support-presentation-harmoniawear-dwwm.pptx
+++ b/Dossier_Projet/support-presentation-harmoniawear-dwwm.pptx
@@ -201,7 +201,7 @@
             </a:lvl1pPr>
           </a:lstStyle>
           <a:p>
-            <a:endParaRPr lang="fr-FR"/>
+            <a:endParaRPr lang="fr-FR" dirty="0"/>
           </a:p>
         </p:txBody>
       </p:sp>
@@ -236,7 +236,7 @@
               <a:rPr lang="fr-FR" smtClean="0"/>
               <a:t>22/01/2026</a:t>
             </a:fld>
-            <a:endParaRPr lang="fr-FR"/>
+            <a:endParaRPr lang="fr-FR" dirty="0"/>
           </a:p>
         </p:txBody>
       </p:sp>
@@ -269,7 +269,7 @@
           <a:bodyPr vert="horz" lIns="91440" tIns="45720" rIns="91440" bIns="45720" rtlCol="0" anchor="ctr"/>
           <a:lstStyle/>
           <a:p>
-            <a:endParaRPr lang="fr-FR"/>
+            <a:endParaRPr lang="fr-FR" dirty="0"/>
           </a:p>
         </p:txBody>
       </p:sp>
@@ -359,7 +359,7 @@
             </a:lvl1pPr>
           </a:lstStyle>
           <a:p>
-            <a:endParaRPr lang="fr-FR"/>
+            <a:endParaRPr lang="fr-FR" dirty="0"/>
           </a:p>
         </p:txBody>
       </p:sp>
@@ -394,7 +394,7 @@
               <a:rPr lang="fr-FR" smtClean="0"/>
               <a:t>‹N°›</a:t>
             </a:fld>
-            <a:endParaRPr lang="fr-FR"/>
+            <a:endParaRPr lang="fr-FR" dirty="0"/>
           </a:p>
         </p:txBody>
       </p:sp>
@@ -533,7 +533,7 @@
           <a:bodyPr/>
           <a:lstStyle/>
           <a:p>
-            <a:endParaRPr lang="fr-FR"/>
+            <a:endParaRPr lang="fr-FR" dirty="0"/>
           </a:p>
         </p:txBody>
       </p:sp>
@@ -578,7 +578,7 @@
               <a:rPr lang="fr-FR" smtClean="0"/>
               <a:t>9</a:t>
             </a:fld>
-            <a:endParaRPr lang="fr-FR"/>
+            <a:endParaRPr lang="fr-FR" dirty="0"/>
           </a:p>
         </p:txBody>
       </p:sp>
@@ -744,7 +744,7 @@
               <a:rPr lang="fr-FR" smtClean="0"/>
               <a:t>22/01/2026</a:t>
             </a:fld>
-            <a:endParaRPr lang="fr-FR"/>
+            <a:endParaRPr lang="fr-FR" dirty="0"/>
           </a:p>
         </p:txBody>
       </p:sp>
@@ -769,7 +769,7 @@
           <a:bodyPr/>
           <a:lstStyle/>
           <a:p>
-            <a:endParaRPr lang="fr-FR"/>
+            <a:endParaRPr lang="fr-FR" dirty="0"/>
           </a:p>
         </p:txBody>
       </p:sp>
@@ -798,7 +798,7 @@
               <a:rPr lang="fr-FR" smtClean="0"/>
               <a:t>‹N°›</a:t>
             </a:fld>
-            <a:endParaRPr lang="fr-FR"/>
+            <a:endParaRPr lang="fr-FR" dirty="0"/>
           </a:p>
         </p:txBody>
       </p:sp>
@@ -942,7 +942,7 @@
               <a:rPr lang="fr-FR" smtClean="0"/>
               <a:t>22/01/2026</a:t>
             </a:fld>
-            <a:endParaRPr lang="fr-FR"/>
+            <a:endParaRPr lang="fr-FR" dirty="0"/>
           </a:p>
         </p:txBody>
       </p:sp>
@@ -967,7 +967,7 @@
           <a:bodyPr/>
           <a:lstStyle/>
           <a:p>
-            <a:endParaRPr lang="fr-FR"/>
+            <a:endParaRPr lang="fr-FR" dirty="0"/>
           </a:p>
         </p:txBody>
       </p:sp>
@@ -996,7 +996,7 @@
               <a:rPr lang="fr-FR" smtClean="0"/>
               <a:t>‹N°›</a:t>
             </a:fld>
-            <a:endParaRPr lang="fr-FR"/>
+            <a:endParaRPr lang="fr-FR" dirty="0"/>
           </a:p>
         </p:txBody>
       </p:sp>
@@ -1150,7 +1150,7 @@
               <a:rPr lang="fr-FR" smtClean="0"/>
               <a:t>22/01/2026</a:t>
             </a:fld>
-            <a:endParaRPr lang="fr-FR"/>
+            <a:endParaRPr lang="fr-FR" dirty="0"/>
           </a:p>
         </p:txBody>
       </p:sp>
@@ -1175,7 +1175,7 @@
           <a:bodyPr/>
           <a:lstStyle/>
           <a:p>
-            <a:endParaRPr lang="fr-FR"/>
+            <a:endParaRPr lang="fr-FR" dirty="0"/>
           </a:p>
         </p:txBody>
       </p:sp>
@@ -1204,7 +1204,7 @@
               <a:rPr lang="fr-FR" smtClean="0"/>
               <a:t>‹N°›</a:t>
             </a:fld>
-            <a:endParaRPr lang="fr-FR"/>
+            <a:endParaRPr lang="fr-FR" dirty="0"/>
           </a:p>
         </p:txBody>
       </p:sp>
@@ -1348,7 +1348,7 @@
               <a:rPr lang="fr-FR" smtClean="0"/>
               <a:t>22/01/2026</a:t>
             </a:fld>
-            <a:endParaRPr lang="fr-FR"/>
+            <a:endParaRPr lang="fr-FR" dirty="0"/>
           </a:p>
         </p:txBody>
       </p:sp>
@@ -1373,7 +1373,7 @@
           <a:bodyPr/>
           <a:lstStyle/>
           <a:p>
-            <a:endParaRPr lang="fr-FR"/>
+            <a:endParaRPr lang="fr-FR" dirty="0"/>
           </a:p>
         </p:txBody>
       </p:sp>
@@ -1402,7 +1402,7 @@
               <a:rPr lang="fr-FR" smtClean="0"/>
               <a:t>‹N°›</a:t>
             </a:fld>
-            <a:endParaRPr lang="fr-FR"/>
+            <a:endParaRPr lang="fr-FR" dirty="0"/>
           </a:p>
         </p:txBody>
       </p:sp>
@@ -1623,7 +1623,7 @@
               <a:rPr lang="fr-FR" smtClean="0"/>
               <a:t>22/01/2026</a:t>
             </a:fld>
-            <a:endParaRPr lang="fr-FR"/>
+            <a:endParaRPr lang="fr-FR" dirty="0"/>
           </a:p>
         </p:txBody>
       </p:sp>
@@ -1648,7 +1648,7 @@
           <a:bodyPr/>
           <a:lstStyle/>
           <a:p>
-            <a:endParaRPr lang="fr-FR"/>
+            <a:endParaRPr lang="fr-FR" dirty="0"/>
           </a:p>
         </p:txBody>
       </p:sp>
@@ -1677,7 +1677,7 @@
               <a:rPr lang="fr-FR" smtClean="0"/>
               <a:t>‹N°›</a:t>
             </a:fld>
-            <a:endParaRPr lang="fr-FR"/>
+            <a:endParaRPr lang="fr-FR" dirty="0"/>
           </a:p>
         </p:txBody>
       </p:sp>
@@ -1888,7 +1888,7 @@
               <a:rPr lang="fr-FR" smtClean="0"/>
               <a:t>22/01/2026</a:t>
             </a:fld>
-            <a:endParaRPr lang="fr-FR"/>
+            <a:endParaRPr lang="fr-FR" dirty="0"/>
           </a:p>
         </p:txBody>
       </p:sp>
@@ -1913,7 +1913,7 @@
           <a:bodyPr/>
           <a:lstStyle/>
           <a:p>
-            <a:endParaRPr lang="fr-FR"/>
+            <a:endParaRPr lang="fr-FR" dirty="0"/>
           </a:p>
         </p:txBody>
       </p:sp>
@@ -1942,7 +1942,7 @@
               <a:rPr lang="fr-FR" smtClean="0"/>
               <a:t>‹N°›</a:t>
             </a:fld>
-            <a:endParaRPr lang="fr-FR"/>
+            <a:endParaRPr lang="fr-FR" dirty="0"/>
           </a:p>
         </p:txBody>
       </p:sp>
@@ -2300,7 +2300,7 @@
               <a:rPr lang="fr-FR" smtClean="0"/>
               <a:t>22/01/2026</a:t>
             </a:fld>
-            <a:endParaRPr lang="fr-FR"/>
+            <a:endParaRPr lang="fr-FR" dirty="0"/>
           </a:p>
         </p:txBody>
       </p:sp>
@@ -2325,7 +2325,7 @@
           <a:bodyPr/>
           <a:lstStyle/>
           <a:p>
-            <a:endParaRPr lang="fr-FR"/>
+            <a:endParaRPr lang="fr-FR" dirty="0"/>
           </a:p>
         </p:txBody>
       </p:sp>
@@ -2354,7 +2354,7 @@
               <a:rPr lang="fr-FR" smtClean="0"/>
               <a:t>‹N°›</a:t>
             </a:fld>
-            <a:endParaRPr lang="fr-FR"/>
+            <a:endParaRPr lang="fr-FR" dirty="0"/>
           </a:p>
         </p:txBody>
       </p:sp>
@@ -2441,7 +2441,7 @@
               <a:rPr lang="fr-FR" smtClean="0"/>
               <a:t>22/01/2026</a:t>
             </a:fld>
-            <a:endParaRPr lang="fr-FR"/>
+            <a:endParaRPr lang="fr-FR" dirty="0"/>
           </a:p>
         </p:txBody>
       </p:sp>
@@ -2466,7 +2466,7 @@
           <a:bodyPr/>
           <a:lstStyle/>
           <a:p>
-            <a:endParaRPr lang="fr-FR"/>
+            <a:endParaRPr lang="fr-FR" dirty="0"/>
           </a:p>
         </p:txBody>
       </p:sp>
@@ -2495,7 +2495,7 @@
               <a:rPr lang="fr-FR" smtClean="0"/>
               <a:t>‹N°›</a:t>
             </a:fld>
-            <a:endParaRPr lang="fr-FR"/>
+            <a:endParaRPr lang="fr-FR" dirty="0"/>
           </a:p>
         </p:txBody>
       </p:sp>
@@ -2554,7 +2554,7 @@
               <a:rPr lang="fr-FR" smtClean="0"/>
               <a:t>22/01/2026</a:t>
             </a:fld>
-            <a:endParaRPr lang="fr-FR"/>
+            <a:endParaRPr lang="fr-FR" dirty="0"/>
           </a:p>
         </p:txBody>
       </p:sp>
@@ -2579,7 +2579,7 @@
           <a:bodyPr/>
           <a:lstStyle/>
           <a:p>
-            <a:endParaRPr lang="fr-FR"/>
+            <a:endParaRPr lang="fr-FR" dirty="0"/>
           </a:p>
         </p:txBody>
       </p:sp>
@@ -2608,7 +2608,7 @@
               <a:rPr lang="fr-FR" smtClean="0"/>
               <a:t>‹N°›</a:t>
             </a:fld>
-            <a:endParaRPr lang="fr-FR"/>
+            <a:endParaRPr lang="fr-FR" dirty="0"/>
           </a:p>
         </p:txBody>
       </p:sp>
@@ -2865,7 +2865,7 @@
               <a:rPr lang="fr-FR" smtClean="0"/>
               <a:t>22/01/2026</a:t>
             </a:fld>
-            <a:endParaRPr lang="fr-FR"/>
+            <a:endParaRPr lang="fr-FR" dirty="0"/>
           </a:p>
         </p:txBody>
       </p:sp>
@@ -2890,7 +2890,7 @@
           <a:bodyPr/>
           <a:lstStyle/>
           <a:p>
-            <a:endParaRPr lang="fr-FR"/>
+            <a:endParaRPr lang="fr-FR" dirty="0"/>
           </a:p>
         </p:txBody>
       </p:sp>
@@ -2919,7 +2919,7 @@
               <a:rPr lang="fr-FR" smtClean="0"/>
               <a:t>‹N°›</a:t>
             </a:fld>
-            <a:endParaRPr lang="fr-FR"/>
+            <a:endParaRPr lang="fr-FR" dirty="0"/>
           </a:p>
         </p:txBody>
       </p:sp>
@@ -3053,7 +3053,7 @@
             </a:lvl9pPr>
           </a:lstStyle>
           <a:p>
-            <a:endParaRPr lang="fr-FR"/>
+            <a:endParaRPr lang="fr-FR" dirty="0"/>
           </a:p>
         </p:txBody>
       </p:sp>
@@ -3153,7 +3153,7 @@
               <a:rPr lang="fr-FR" smtClean="0"/>
               <a:t>22/01/2026</a:t>
             </a:fld>
-            <a:endParaRPr lang="fr-FR"/>
+            <a:endParaRPr lang="fr-FR" dirty="0"/>
           </a:p>
         </p:txBody>
       </p:sp>
@@ -3178,7 +3178,7 @@
           <a:bodyPr/>
           <a:lstStyle/>
           <a:p>
-            <a:endParaRPr lang="fr-FR"/>
+            <a:endParaRPr lang="fr-FR" dirty="0"/>
           </a:p>
         </p:txBody>
       </p:sp>
@@ -3207,7 +3207,7 @@
               <a:rPr lang="fr-FR" smtClean="0"/>
               <a:t>‹N°›</a:t>
             </a:fld>
-            <a:endParaRPr lang="fr-FR"/>
+            <a:endParaRPr lang="fr-FR" dirty="0"/>
           </a:p>
         </p:txBody>
       </p:sp>
@@ -3394,7 +3394,7 @@
               <a:rPr lang="fr-FR" smtClean="0"/>
               <a:t>22/01/2026</a:t>
             </a:fld>
-            <a:endParaRPr lang="fr-FR"/>
+            <a:endParaRPr lang="fr-FR" dirty="0"/>
           </a:p>
         </p:txBody>
       </p:sp>
@@ -3437,7 +3437,7 @@
             </a:lvl1pPr>
           </a:lstStyle>
           <a:p>
-            <a:endParaRPr lang="fr-FR"/>
+            <a:endParaRPr lang="fr-FR" dirty="0"/>
           </a:p>
         </p:txBody>
       </p:sp>
@@ -3484,7 +3484,7 @@
               <a:rPr lang="fr-FR" smtClean="0"/>
               <a:t>‹N°›</a:t>
             </a:fld>
-            <a:endParaRPr lang="fr-FR"/>
+            <a:endParaRPr lang="fr-FR" dirty="0"/>
           </a:p>
         </p:txBody>
       </p:sp>
@@ -4899,66 +4899,42 @@
             </a:pPr>
             <a:r>
               <a:rPr lang="fr-FR" sz="1800" dirty="0"/>
-              <a:t> </a:t>
-            </a:r>
-            <a:r>
-              <a:rPr lang="fr-FR" sz="1800" dirty="0" err="1"/>
-              <a:t>ESLint</a:t>
-            </a:r>
+              <a:t> ESLint et Prettier configurés pour garantir un code cohérent et lisible</a:t>
+            </a:r>
+          </a:p>
+          <a:p>
+            <a:pPr algn="l" eaLnBrk="0" fontAlgn="base" hangingPunct="0">
+              <a:lnSpc>
+                <a:spcPct val="100000"/>
+              </a:lnSpc>
+              <a:spcBef>
+                <a:spcPct val="0"/>
+              </a:spcBef>
+              <a:spcAft>
+                <a:spcPct val="0"/>
+              </a:spcAft>
+              <a:buFontTx/>
+              <a:buChar char="•"/>
+            </a:pPr>
+            <a:endParaRPr lang="fr-FR" sz="1800" dirty="0"/>
+          </a:p>
+          <a:p>
+            <a:pPr algn="l" eaLnBrk="0" fontAlgn="base" hangingPunct="0">
+              <a:lnSpc>
+                <a:spcPct val="100000"/>
+              </a:lnSpc>
+              <a:spcBef>
+                <a:spcPct val="0"/>
+              </a:spcBef>
+              <a:spcAft>
+                <a:spcPct val="0"/>
+              </a:spcAft>
+              <a:buFontTx/>
+              <a:buChar char="•"/>
+            </a:pPr>
             <a:r>
               <a:rPr lang="fr-FR" sz="1800" dirty="0"/>
-              <a:t> et </a:t>
-            </a:r>
-            <a:r>
-              <a:rPr lang="fr-FR" sz="1800" dirty="0" err="1"/>
-              <a:t>Prettier</a:t>
-            </a:r>
-            <a:r>
-              <a:rPr lang="fr-FR" sz="1800" dirty="0"/>
-              <a:t> configurés pour garantir un code cohérent et lisible</a:t>
-            </a:r>
-          </a:p>
-          <a:p>
-            <a:pPr algn="l" eaLnBrk="0" fontAlgn="base" hangingPunct="0">
-              <a:lnSpc>
-                <a:spcPct val="100000"/>
-              </a:lnSpc>
-              <a:spcBef>
-                <a:spcPct val="0"/>
-              </a:spcBef>
-              <a:spcAft>
-                <a:spcPct val="0"/>
-              </a:spcAft>
-              <a:buFontTx/>
-              <a:buChar char="•"/>
-            </a:pPr>
-            <a:endParaRPr lang="fr-FR" sz="1800" dirty="0"/>
-          </a:p>
-          <a:p>
-            <a:pPr algn="l" eaLnBrk="0" fontAlgn="base" hangingPunct="0">
-              <a:lnSpc>
-                <a:spcPct val="100000"/>
-              </a:lnSpc>
-              <a:spcBef>
-                <a:spcPct val="0"/>
-              </a:spcBef>
-              <a:spcAft>
-                <a:spcPct val="0"/>
-              </a:spcAft>
-              <a:buFontTx/>
-              <a:buChar char="•"/>
-            </a:pPr>
-            <a:r>
-              <a:rPr lang="fr-FR" sz="1800" dirty="0"/>
-              <a:t> Structure de dossiers claire et organisée (front-end / </a:t>
-            </a:r>
-            <a:r>
-              <a:rPr lang="fr-FR" sz="1800" dirty="0" err="1"/>
-              <a:t>back-end</a:t>
-            </a:r>
-            <a:r>
-              <a:rPr lang="fr-FR" sz="1800" dirty="0"/>
-              <a:t> / composants)</a:t>
+              <a:t> Structure de dossiers claire et organisée (front-end / back-end / composants)</a:t>
             </a:r>
           </a:p>
           <a:p>
@@ -5722,13 +5698,8 @@
             </a:pPr>
             <a:r>
               <a:rPr lang="fr-FR" sz="1800" dirty="0"/>
-              <a:t> Gestion de la synchronisation entre front-end et </a:t>
-            </a:r>
-            <a:r>
-              <a:rPr lang="fr-FR" sz="1800" dirty="0" err="1"/>
-              <a:t>back-end</a:t>
-            </a:r>
-            <a:endParaRPr lang="fr-FR" sz="1800" dirty="0"/>
+              <a:t> Gestion de la synchronisation entre front-end et back-end</a:t>
+            </a:r>
           </a:p>
           <a:p>
             <a:pPr algn="l" eaLnBrk="0" fontAlgn="base" hangingPunct="0">
@@ -7031,31 +7002,8 @@
                 <a:effectLst/>
                 <a:latin typeface="Arial" panose="020B0604020202020204" pitchFamily="34" charset="0"/>
               </a:rPr>
-              <a:t> Séparer clairement le front-end et le </a:t>
-            </a:r>
-            <a:r>
-              <a:rPr kumimoji="0" lang="fr-FR" altLang="fr-FR" sz="1800" b="0" i="0" u="none" strike="noStrike" cap="none" normalizeH="0" baseline="0" dirty="0" err="1">
-                <a:ln>
-                  <a:noFill/>
-                </a:ln>
-                <a:solidFill>
-                  <a:schemeClr val="tx1"/>
-                </a:solidFill>
-                <a:effectLst/>
-                <a:latin typeface="Arial" panose="020B0604020202020204" pitchFamily="34" charset="0"/>
-              </a:rPr>
-              <a:t>back-end</a:t>
-            </a:r>
-            <a:endParaRPr kumimoji="0" lang="fr-FR" altLang="fr-FR" sz="1800" b="0" i="0" u="none" strike="noStrike" cap="none" normalizeH="0" baseline="0" dirty="0">
-              <a:ln>
-                <a:noFill/>
-              </a:ln>
-              <a:solidFill>
-                <a:schemeClr val="tx1"/>
-              </a:solidFill>
-              <a:effectLst/>
-              <a:latin typeface="Arial" panose="020B0604020202020204" pitchFamily="34" charset="0"/>
-            </a:endParaRPr>
+              <a:t> Séparer clairement le front-end et le back-end</a:t>
+            </a:r>
           </a:p>
           <a:p>
             <a:pPr marL="0" marR="0" lvl="0" indent="0" algn="l" defTabSz="914400" rtl="0" eaLnBrk="0" fontAlgn="base" latinLnBrk="0" hangingPunct="0">
@@ -7305,31 +7253,8 @@
                 <a:effectLst/>
                 <a:latin typeface="Arial" panose="020B0604020202020204" pitchFamily="34" charset="0"/>
               </a:rPr>
-              <a:t> API </a:t>
-            </a:r>
-            <a:r>
-              <a:rPr kumimoji="0" lang="fr-FR" altLang="fr-FR" sz="7200" b="0" i="0" u="none" strike="noStrike" cap="none" normalizeH="0" baseline="0" dirty="0" err="1">
-                <a:ln>
-                  <a:noFill/>
-                </a:ln>
-                <a:solidFill>
-                  <a:schemeClr val="tx1"/>
-                </a:solidFill>
-                <a:effectLst/>
-                <a:latin typeface="Arial" panose="020B0604020202020204" pitchFamily="34" charset="0"/>
-              </a:rPr>
-              <a:t>back-end</a:t>
-            </a:r>
-            <a:endParaRPr kumimoji="0" lang="fr-FR" altLang="fr-FR" sz="7200" b="0" i="0" u="none" strike="noStrike" cap="none" normalizeH="0" baseline="0" dirty="0">
-              <a:ln>
-                <a:noFill/>
-              </a:ln>
-              <a:solidFill>
-                <a:schemeClr val="tx1"/>
-              </a:solidFill>
-              <a:effectLst/>
-              <a:latin typeface="Arial" panose="020B0604020202020204" pitchFamily="34" charset="0"/>
-            </a:endParaRPr>
+              <a:t> API back-end</a:t>
+            </a:r>
           </a:p>
           <a:p>
             <a:pPr lvl="0" algn="l" eaLnBrk="0" fontAlgn="base" hangingPunct="0">
@@ -8294,15 +8219,7 @@
             </a:pPr>
             <a:r>
               <a:rPr lang="fr-FR" sz="1800" dirty="0"/>
-              <a:t> Le </a:t>
-            </a:r>
-            <a:r>
-              <a:rPr lang="fr-FR" sz="1800" dirty="0" err="1"/>
-              <a:t>back-end</a:t>
-            </a:r>
-            <a:r>
-              <a:rPr lang="fr-FR" sz="1800" dirty="0"/>
-              <a:t> centralise la logique métier</a:t>
+              <a:t> Le back-end centralise la logique métier</a:t>
             </a:r>
           </a:p>
           <a:p>

</xml_diff>